<commit_message>
esta es otra version
</commit_message>
<xml_diff>
--- a/alumnos.pptx
+++ b/alumnos.pptx
@@ -6,6 +6,7 @@
   </p:sldMasterIdLst>
   <p:sldIdLst>
     <p:sldId id="256" r:id="rId2"/>
+    <p:sldId id="257" r:id="rId3"/>
   </p:sldIdLst>
   <p:sldSz cx="12192000" cy="6858000"/>
   <p:notesSz cx="6858000" cy="9144000"/>
@@ -104,6 +105,11 @@
       </a:defRPr>
     </a:lvl9pPr>
   </p:defaultTextStyle>
+  <p:extLst>
+    <p:ext uri="{EFAFB233-063F-42B5-8137-9DF3F51BA10A}">
+      <p15:sldGuideLst xmlns:p15="http://schemas.microsoft.com/office/powerpoint/2012/main"/>
+    </p:ext>
+  </p:extLst>
 </p:presentation>
 </file>
 
@@ -6052,6 +6058,167 @@
 </p:sld>
 </file>
 
+<file path=ppt/slides/slide2.xml><?xml version="1.0" encoding="utf-8"?>
+<p:sld xmlns:a="http://schemas.openxmlformats.org/drawingml/2006/main" xmlns:r="http://schemas.openxmlformats.org/officeDocument/2006/relationships" xmlns:p="http://schemas.openxmlformats.org/presentationml/2006/main">
+  <p:cSld>
+    <p:spTree>
+      <p:nvGrpSpPr>
+        <p:cNvPr id="1" name=""/>
+        <p:cNvGrpSpPr/>
+        <p:nvPr/>
+      </p:nvGrpSpPr>
+      <p:grpSpPr>
+        <a:xfrm>
+          <a:off x="0" y="0"/>
+          <a:ext cx="0" cy="0"/>
+          <a:chOff x="0" y="0"/>
+          <a:chExt cx="0" cy="0"/>
+        </a:xfrm>
+      </p:grpSpPr>
+      <p:sp>
+        <p:nvSpPr>
+          <p:cNvPr id="3" name="Marcador de contenido 2"/>
+          <p:cNvSpPr>
+            <a:spLocks noGrp="1"/>
+          </p:cNvSpPr>
+          <p:nvPr>
+            <p:ph idx="1"/>
+          </p:nvPr>
+        </p:nvSpPr>
+        <p:spPr/>
+        <p:txBody>
+          <a:bodyPr/>
+          <a:lstStyle/>
+          <a:p>
+            <a:r>
+              <a:rPr lang="es-US" dirty="0" smtClean="0"/>
+              <a:t>Eric </a:t>
+            </a:r>
+            <a:r>
+              <a:rPr lang="es-US" dirty="0" err="1" smtClean="0"/>
+              <a:t>alejandro</a:t>
+            </a:r>
+            <a:r>
+              <a:rPr lang="es-US" dirty="0" smtClean="0"/>
+              <a:t> cervantes contreras</a:t>
+            </a:r>
+          </a:p>
+          <a:p>
+            <a:r>
+              <a:rPr lang="es-US" dirty="0" smtClean="0"/>
+              <a:t>Blas </a:t>
+            </a:r>
+            <a:r>
+              <a:rPr lang="es-US" dirty="0" err="1" smtClean="0"/>
+              <a:t>uballe</a:t>
+            </a:r>
+            <a:r>
+              <a:rPr lang="es-US" dirty="0" smtClean="0"/>
+              <a:t> </a:t>
+            </a:r>
+          </a:p>
+          <a:p>
+            <a:r>
+              <a:rPr lang="es-US" dirty="0" smtClean="0"/>
+              <a:t>834 222 1430</a:t>
+            </a:r>
+          </a:p>
+          <a:p>
+            <a:r>
+              <a:rPr lang="es-US" dirty="0" smtClean="0">
+                <a:hlinkClick r:id="rId2"/>
+              </a:rPr>
+              <a:t>calex1243@Gmail.com</a:t>
+            </a:r>
+            <a:endParaRPr lang="es-US" dirty="0" smtClean="0"/>
+          </a:p>
+          <a:p>
+            <a:endParaRPr lang="es-MX" dirty="0"/>
+          </a:p>
+        </p:txBody>
+      </p:sp>
+      <p:sp>
+        <p:nvSpPr>
+          <p:cNvPr id="4" name="AutoShape 2" descr="https://http2.mlstatic.com/pc-gamer-xtreme-intel-i9-9900k-32gb-m2-512gb-2tb-rtx-2080-D_NQ_NP_760417-MLM40399860264_012020-F.webp"/>
+          <p:cNvSpPr>
+            <a:spLocks noChangeAspect="1" noChangeArrowheads="1"/>
+          </p:cNvSpPr>
+          <p:nvPr/>
+        </p:nvSpPr>
+        <p:spPr bwMode="auto">
+          <a:xfrm>
+            <a:off x="155575" y="-144463"/>
+            <a:ext cx="304800" cy="304801"/>
+          </a:xfrm>
+          <a:prstGeom prst="rect">
+            <a:avLst/>
+          </a:prstGeom>
+          <a:noFill/>
+          <a:extLst>
+            <a:ext uri="{909E8E84-426E-40DD-AFC4-6F175D3DCCD1}">
+              <a14:hiddenFill xmlns:a14="http://schemas.microsoft.com/office/drawing/2010/main">
+                <a:solidFill>
+                  <a:srgbClr val="FFFFFF"/>
+                </a:solidFill>
+              </a14:hiddenFill>
+            </a:ext>
+          </a:extLst>
+        </p:spPr>
+        <p:txBody>
+          <a:bodyPr vert="horz" wrap="square" lIns="91440" tIns="45720" rIns="91440" bIns="45720" numCol="1" anchor="t" anchorCtr="0" compatLnSpc="1">
+            <a:prstTxWarp prst="textNoShape">
+              <a:avLst/>
+            </a:prstTxWarp>
+          </a:bodyPr>
+          <a:lstStyle/>
+          <a:p>
+            <a:endParaRPr lang="es-MX"/>
+          </a:p>
+        </p:txBody>
+      </p:sp>
+      <p:pic>
+        <p:nvPicPr>
+          <p:cNvPr id="5" name="Imagen 4" descr="Recorte de pantalla"/>
+          <p:cNvPicPr>
+            <a:picLocks noChangeAspect="1"/>
+          </p:cNvPicPr>
+          <p:nvPr/>
+        </p:nvPicPr>
+        <p:blipFill>
+          <a:blip r:embed="rId3">
+            <a:extLst>
+              <a:ext uri="{28A0092B-C50C-407E-A947-70E740481C1C}">
+                <a14:useLocalDpi xmlns:a14="http://schemas.microsoft.com/office/drawing/2010/main" val="0"/>
+              </a:ext>
+            </a:extLst>
+          </a:blip>
+          <a:stretch>
+            <a:fillRect/>
+          </a:stretch>
+        </p:blipFill>
+        <p:spPr>
+          <a:xfrm>
+            <a:off x="6162967" y="1981581"/>
+            <a:ext cx="3057945" cy="3586004"/>
+          </a:xfrm>
+          <a:prstGeom prst="rect">
+            <a:avLst/>
+          </a:prstGeom>
+        </p:spPr>
+      </p:pic>
+    </p:spTree>
+    <p:extLst>
+      <p:ext uri="{BB962C8B-B14F-4D97-AF65-F5344CB8AC3E}">
+        <p14:creationId xmlns:p14="http://schemas.microsoft.com/office/powerpoint/2010/main" val="3865274265"/>
+      </p:ext>
+    </p:extLst>
+  </p:cSld>
+  <p:clrMapOvr>
+    <a:masterClrMapping/>
+  </p:clrMapOvr>
+</p:sld>
+</file>
+
 <file path=ppt/theme/theme1.xml><?xml version="1.0" encoding="utf-8"?>
 <a:theme xmlns:a="http://schemas.openxmlformats.org/drawingml/2006/main" name="Ion">
   <a:themeElements>

</xml_diff>